<commit_message>
cover front page with a picture of flasks
</commit_message>
<xml_diff>
--- a/app/assets/images/chem-lab-note-logo.pptx
+++ b/app/assets/images/chem-lab-note-logo.pptx
@@ -6,6 +6,7 @@
   </p:sldMasterIdLst>
   <p:sldIdLst>
     <p:sldId id="256" r:id="rId2"/>
+    <p:sldId id="257" r:id="rId3"/>
   </p:sldIdLst>
   <p:sldSz cx="12192000" cy="6858000"/>
   <p:notesSz cx="6858000" cy="9144000"/>
@@ -106,7 +107,18 @@
   </p:defaultTextStyle>
   <p:extLst>
     <p:ext uri="{EFAFB233-063F-42B5-8137-9DF3F51BA10A}">
-      <p15:sldGuideLst xmlns:p15="http://schemas.microsoft.com/office/powerpoint/2012/main"/>
+      <p15:sldGuideLst xmlns:p15="http://schemas.microsoft.com/office/powerpoint/2012/main">
+        <p15:guide id="1" orient="horz" pos="1008" userDrawn="1">
+          <p15:clr>
+            <a:srgbClr val="A4A3A4"/>
+          </p15:clr>
+        </p15:guide>
+        <p15:guide id="2" pos="3840" userDrawn="1">
+          <p15:clr>
+            <a:srgbClr val="A4A3A4"/>
+          </p15:clr>
+        </p15:guide>
+      </p15:sldGuideLst>
     </p:ext>
   </p:extLst>
 </p:presentation>
@@ -2969,18 +2981,545 @@
           <a:chExt cx="0" cy="0"/>
         </a:xfrm>
       </p:grpSpPr>
+      <p:sp>
+        <p:nvSpPr>
+          <p:cNvPr id="5" name="Rectangle 4"/>
+          <p:cNvSpPr/>
+          <p:nvPr/>
+        </p:nvSpPr>
+        <p:spPr>
+          <a:xfrm>
+            <a:off x="2901206" y="1585913"/>
+            <a:ext cx="1800225" cy="2543175"/>
+          </a:xfrm>
+          <a:prstGeom prst="rect">
+            <a:avLst/>
+          </a:prstGeom>
+          <a:solidFill>
+            <a:srgbClr val="C5CAE9"/>
+          </a:solidFill>
+          <a:ln>
+            <a:noFill/>
+          </a:ln>
+        </p:spPr>
+        <p:style>
+          <a:lnRef idx="2">
+            <a:schemeClr val="accent1">
+              <a:shade val="50000"/>
+            </a:schemeClr>
+          </a:lnRef>
+          <a:fillRef idx="1">
+            <a:schemeClr val="accent1"/>
+          </a:fillRef>
+          <a:effectRef idx="0">
+            <a:schemeClr val="accent1"/>
+          </a:effectRef>
+          <a:fontRef idx="minor">
+            <a:schemeClr val="lt1"/>
+          </a:fontRef>
+        </p:style>
+        <p:txBody>
+          <a:bodyPr rtlCol="0" anchor="ctr"/>
+          <a:lstStyle/>
+          <a:p>
+            <a:pPr algn="ctr"/>
+            <a:r>
+              <a:rPr lang="en-US" sz="9600" b="1" dirty="0" smtClean="0">
+                <a:solidFill>
+                  <a:schemeClr val="tx1">
+                    <a:lumMod val="75000"/>
+                    <a:lumOff val="25000"/>
+                  </a:schemeClr>
+                </a:solidFill>
+                <a:latin typeface="Apple Braille" charset="0"/>
+                <a:ea typeface="Apple Braille" charset="0"/>
+                <a:cs typeface="Apple Braille" charset="0"/>
+              </a:rPr>
+              <a:t>C</a:t>
+            </a:r>
+            <a:endParaRPr lang="en-US" sz="9600" b="1" dirty="0">
+              <a:solidFill>
+                <a:schemeClr val="tx1">
+                  <a:lumMod val="75000"/>
+                  <a:lumOff val="25000"/>
+                </a:schemeClr>
+              </a:solidFill>
+              <a:latin typeface="Apple Braille" charset="0"/>
+              <a:ea typeface="Apple Braille" charset="0"/>
+              <a:cs typeface="Apple Braille" charset="0"/>
+            </a:endParaRPr>
+          </a:p>
+        </p:txBody>
+      </p:sp>
+      <p:sp>
+        <p:nvSpPr>
+          <p:cNvPr id="6" name="TextBox 5"/>
+          <p:cNvSpPr txBox="1"/>
+          <p:nvPr/>
+        </p:nvSpPr>
+        <p:spPr>
+          <a:xfrm>
+            <a:off x="3172666" y="1728782"/>
+            <a:ext cx="45719" cy="523220"/>
+          </a:xfrm>
+          <a:prstGeom prst="rect">
+            <a:avLst/>
+          </a:prstGeom>
+          <a:noFill/>
+        </p:spPr>
+        <p:txBody>
+          <a:bodyPr wrap="square" rtlCol="0">
+            <a:spAutoFit/>
+          </a:bodyPr>
+          <a:lstStyle/>
+          <a:p>
+            <a:r>
+              <a:rPr lang="en-US" sz="2800" b="1" dirty="0" smtClean="0">
+                <a:solidFill>
+                  <a:schemeClr val="tx1">
+                    <a:lumMod val="75000"/>
+                    <a:lumOff val="25000"/>
+                  </a:schemeClr>
+                </a:solidFill>
+                <a:latin typeface="Apple Braille" charset="0"/>
+                <a:ea typeface="Apple Braille" charset="0"/>
+                <a:cs typeface="Apple Braille" charset="0"/>
+              </a:rPr>
+              <a:t>6</a:t>
+            </a:r>
+            <a:endParaRPr lang="en-US" sz="2800" b="1" dirty="0">
+              <a:solidFill>
+                <a:schemeClr val="tx1">
+                  <a:lumMod val="75000"/>
+                  <a:lumOff val="25000"/>
+                </a:schemeClr>
+              </a:solidFill>
+              <a:latin typeface="Apple Braille" charset="0"/>
+              <a:ea typeface="Apple Braille" charset="0"/>
+              <a:cs typeface="Apple Braille" charset="0"/>
+            </a:endParaRPr>
+          </a:p>
+        </p:txBody>
+      </p:sp>
+      <p:sp>
+        <p:nvSpPr>
+          <p:cNvPr id="10" name="Rectangle 9"/>
+          <p:cNvSpPr/>
+          <p:nvPr/>
+        </p:nvSpPr>
+        <p:spPr>
+          <a:xfrm>
+            <a:off x="5995993" y="1585913"/>
+            <a:ext cx="1800225" cy="2543175"/>
+          </a:xfrm>
+          <a:prstGeom prst="rect">
+            <a:avLst/>
+          </a:prstGeom>
+          <a:solidFill>
+            <a:srgbClr val="9499B7"/>
+          </a:solidFill>
+          <a:ln>
+            <a:noFill/>
+          </a:ln>
+        </p:spPr>
+        <p:style>
+          <a:lnRef idx="2">
+            <a:schemeClr val="accent1">
+              <a:shade val="50000"/>
+            </a:schemeClr>
+          </a:lnRef>
+          <a:fillRef idx="1">
+            <a:schemeClr val="accent1"/>
+          </a:fillRef>
+          <a:effectRef idx="0">
+            <a:schemeClr val="accent1"/>
+          </a:effectRef>
+          <a:fontRef idx="minor">
+            <a:schemeClr val="lt1"/>
+          </a:fontRef>
+        </p:style>
+        <p:txBody>
+          <a:bodyPr rtlCol="0" anchor="ctr"/>
+          <a:lstStyle/>
+          <a:p>
+            <a:pPr algn="ctr"/>
+            <a:r>
+              <a:rPr lang="en-US" sz="9600" b="1" dirty="0" smtClean="0">
+                <a:solidFill>
+                  <a:schemeClr val="tx1"/>
+                </a:solidFill>
+                <a:latin typeface="Apple Braille" charset="0"/>
+                <a:ea typeface="Apple Braille" charset="0"/>
+                <a:cs typeface="Apple Braille" charset="0"/>
+              </a:rPr>
+              <a:t>L</a:t>
+            </a:r>
+            <a:r>
+              <a:rPr lang="en-US" sz="9600" b="1" dirty="0">
+                <a:solidFill>
+                  <a:schemeClr val="tx1"/>
+                </a:solidFill>
+                <a:latin typeface="Apple Braille" charset="0"/>
+                <a:ea typeface="Apple Braille" charset="0"/>
+                <a:cs typeface="Apple Braille" charset="0"/>
+              </a:rPr>
+              <a:t>a</a:t>
+            </a:r>
+            <a:endParaRPr lang="en-US" sz="9600" b="1" dirty="0">
+              <a:solidFill>
+                <a:schemeClr val="tx1"/>
+              </a:solidFill>
+              <a:latin typeface="Apple Braille" charset="0"/>
+              <a:ea typeface="Apple Braille" charset="0"/>
+              <a:cs typeface="Apple Braille" charset="0"/>
+            </a:endParaRPr>
+          </a:p>
+        </p:txBody>
+      </p:sp>
+      <p:sp>
+        <p:nvSpPr>
+          <p:cNvPr id="11" name="TextBox 10"/>
+          <p:cNvSpPr txBox="1"/>
+          <p:nvPr/>
+        </p:nvSpPr>
+        <p:spPr>
+          <a:xfrm flipH="1">
+            <a:off x="6350909" y="1728782"/>
+            <a:ext cx="600204" cy="523220"/>
+          </a:xfrm>
+          <a:prstGeom prst="rect">
+            <a:avLst/>
+          </a:prstGeom>
+          <a:noFill/>
+        </p:spPr>
+        <p:txBody>
+          <a:bodyPr wrap="square" rtlCol="0">
+            <a:spAutoFit/>
+          </a:bodyPr>
+          <a:lstStyle/>
+          <a:p>
+            <a:r>
+              <a:rPr lang="en-US" sz="2800" b="1" smtClean="0">
+                <a:solidFill>
+                  <a:schemeClr val="tx1">
+                    <a:lumMod val="75000"/>
+                    <a:lumOff val="25000"/>
+                  </a:schemeClr>
+                </a:solidFill>
+                <a:latin typeface="Apple Braille" charset="0"/>
+                <a:ea typeface="Apple Braille" charset="0"/>
+                <a:cs typeface="Apple Braille" charset="0"/>
+              </a:rPr>
+              <a:t>57</a:t>
+            </a:r>
+            <a:endParaRPr lang="en-US" sz="2800" b="1" dirty="0">
+              <a:solidFill>
+                <a:schemeClr val="tx1">
+                  <a:lumMod val="75000"/>
+                  <a:lumOff val="25000"/>
+                </a:schemeClr>
+              </a:solidFill>
+              <a:latin typeface="Apple Braille" charset="0"/>
+              <a:ea typeface="Apple Braille" charset="0"/>
+              <a:cs typeface="Apple Braille" charset="0"/>
+            </a:endParaRPr>
+          </a:p>
+        </p:txBody>
+      </p:sp>
+      <p:sp>
+        <p:nvSpPr>
+          <p:cNvPr id="12" name="Rectangle 11"/>
+          <p:cNvSpPr/>
+          <p:nvPr/>
+        </p:nvSpPr>
+        <p:spPr>
+          <a:xfrm>
+            <a:off x="7366101" y="2072670"/>
+            <a:ext cx="845103" cy="1569660"/>
+          </a:xfrm>
+          <a:prstGeom prst="rect">
+            <a:avLst/>
+          </a:prstGeom>
+        </p:spPr>
+        <p:txBody>
+          <a:bodyPr wrap="none">
+            <a:spAutoFit/>
+          </a:bodyPr>
+          <a:lstStyle/>
+          <a:p>
+            <a:pPr algn="ctr"/>
+            <a:r>
+              <a:rPr lang="en-US" sz="9600" b="1" dirty="0" smtClean="0">
+                <a:solidFill>
+                  <a:srgbClr val="C5CAE9"/>
+                </a:solidFill>
+                <a:latin typeface="Apple Braille" charset="0"/>
+                <a:ea typeface="Apple Braille" charset="0"/>
+                <a:cs typeface="Apple Braille" charset="0"/>
+              </a:rPr>
+              <a:t>b</a:t>
+            </a:r>
+            <a:endParaRPr lang="en-US" sz="9600" b="1" dirty="0">
+              <a:solidFill>
+                <a:srgbClr val="C5CAE9"/>
+              </a:solidFill>
+              <a:latin typeface="Apple Braille" charset="0"/>
+              <a:ea typeface="Apple Braille" charset="0"/>
+              <a:cs typeface="Apple Braille" charset="0"/>
+            </a:endParaRPr>
+          </a:p>
+        </p:txBody>
+      </p:sp>
+      <p:sp>
+        <p:nvSpPr>
+          <p:cNvPr id="14" name="Rectangle 13"/>
+          <p:cNvSpPr/>
+          <p:nvPr/>
+        </p:nvSpPr>
+        <p:spPr>
+          <a:xfrm>
+            <a:off x="8283554" y="1585912"/>
+            <a:ext cx="1800225" cy="2543175"/>
+          </a:xfrm>
+          <a:prstGeom prst="rect">
+            <a:avLst/>
+          </a:prstGeom>
+          <a:solidFill>
+            <a:srgbClr val="C5CAE9"/>
+          </a:solidFill>
+          <a:ln>
+            <a:noFill/>
+          </a:ln>
+        </p:spPr>
+        <p:style>
+          <a:lnRef idx="2">
+            <a:schemeClr val="accent1">
+              <a:shade val="50000"/>
+            </a:schemeClr>
+          </a:lnRef>
+          <a:fillRef idx="1">
+            <a:schemeClr val="accent1"/>
+          </a:fillRef>
+          <a:effectRef idx="0">
+            <a:schemeClr val="accent1"/>
+          </a:effectRef>
+          <a:fontRef idx="minor">
+            <a:schemeClr val="lt1"/>
+          </a:fontRef>
+        </p:style>
+        <p:txBody>
+          <a:bodyPr rtlCol="0" anchor="ctr"/>
+          <a:lstStyle/>
+          <a:p>
+            <a:pPr algn="ctr"/>
+            <a:r>
+              <a:rPr lang="en-US" sz="9600" b="1" dirty="0" smtClean="0">
+                <a:solidFill>
+                  <a:schemeClr val="tx1">
+                    <a:lumMod val="75000"/>
+                    <a:lumOff val="25000"/>
+                  </a:schemeClr>
+                </a:solidFill>
+                <a:latin typeface="Apple Braille" charset="0"/>
+                <a:ea typeface="Apple Braille" charset="0"/>
+                <a:cs typeface="Apple Braille" charset="0"/>
+              </a:rPr>
+              <a:t>N</a:t>
+            </a:r>
+            <a:endParaRPr lang="en-US" sz="9600" b="1" dirty="0">
+              <a:solidFill>
+                <a:schemeClr val="tx1">
+                  <a:lumMod val="75000"/>
+                  <a:lumOff val="25000"/>
+                </a:schemeClr>
+              </a:solidFill>
+              <a:latin typeface="Apple Braille" charset="0"/>
+              <a:ea typeface="Apple Braille" charset="0"/>
+              <a:cs typeface="Apple Braille" charset="0"/>
+            </a:endParaRPr>
+          </a:p>
+        </p:txBody>
+      </p:sp>
+      <p:sp>
+        <p:nvSpPr>
+          <p:cNvPr id="16" name="TextBox 15"/>
+          <p:cNvSpPr txBox="1"/>
+          <p:nvPr/>
+        </p:nvSpPr>
+        <p:spPr>
+          <a:xfrm flipH="1">
+            <a:off x="8560462" y="1728782"/>
+            <a:ext cx="637943" cy="523220"/>
+          </a:xfrm>
+          <a:prstGeom prst="rect">
+            <a:avLst/>
+          </a:prstGeom>
+          <a:noFill/>
+        </p:spPr>
+        <p:txBody>
+          <a:bodyPr wrap="square" rtlCol="0">
+            <a:spAutoFit/>
+          </a:bodyPr>
+          <a:lstStyle/>
+          <a:p>
+            <a:r>
+              <a:rPr lang="en-US" sz="2800" b="1" dirty="0" smtClean="0">
+                <a:solidFill>
+                  <a:schemeClr val="tx1">
+                    <a:lumMod val="75000"/>
+                    <a:lumOff val="25000"/>
+                  </a:schemeClr>
+                </a:solidFill>
+                <a:latin typeface="Apple Braille" charset="0"/>
+                <a:ea typeface="Apple Braille" charset="0"/>
+                <a:cs typeface="Apple Braille" charset="0"/>
+              </a:rPr>
+              <a:t>7</a:t>
+            </a:r>
+            <a:endParaRPr lang="en-US" sz="2800" b="1" dirty="0">
+              <a:solidFill>
+                <a:schemeClr val="tx1">
+                  <a:lumMod val="75000"/>
+                  <a:lumOff val="25000"/>
+                </a:schemeClr>
+              </a:solidFill>
+              <a:latin typeface="Apple Braille" charset="0"/>
+              <a:ea typeface="Apple Braille" charset="0"/>
+              <a:cs typeface="Apple Braille" charset="0"/>
+            </a:endParaRPr>
+          </a:p>
+        </p:txBody>
+      </p:sp>
+      <p:sp>
+        <p:nvSpPr>
+          <p:cNvPr id="17" name="Rectangle 16"/>
+          <p:cNvSpPr/>
+          <p:nvPr/>
+        </p:nvSpPr>
+        <p:spPr>
+          <a:xfrm>
+            <a:off x="9446897" y="2086005"/>
+            <a:ext cx="1878720" cy="1569660"/>
+          </a:xfrm>
+          <a:prstGeom prst="rect">
+            <a:avLst/>
+          </a:prstGeom>
+        </p:spPr>
+        <p:txBody>
+          <a:bodyPr wrap="none">
+            <a:spAutoFit/>
+          </a:bodyPr>
+          <a:lstStyle/>
+          <a:p>
+            <a:pPr algn="ctr"/>
+            <a:r>
+              <a:rPr lang="en-US" sz="9600" b="1" dirty="0" err="1" smtClean="0">
+                <a:solidFill>
+                  <a:srgbClr val="9499B7"/>
+                </a:solidFill>
+                <a:latin typeface="Apple Braille" charset="0"/>
+                <a:ea typeface="Apple Braille" charset="0"/>
+                <a:cs typeface="Apple Braille" charset="0"/>
+              </a:rPr>
+              <a:t>ote</a:t>
+            </a:r>
+            <a:endParaRPr lang="en-US" sz="9600" b="1" dirty="0">
+              <a:solidFill>
+                <a:srgbClr val="9499B7"/>
+              </a:solidFill>
+              <a:latin typeface="Apple Braille" charset="0"/>
+              <a:ea typeface="Apple Braille" charset="0"/>
+              <a:cs typeface="Apple Braille" charset="0"/>
+            </a:endParaRPr>
+          </a:p>
+        </p:txBody>
+      </p:sp>
+      <p:sp>
+        <p:nvSpPr>
+          <p:cNvPr id="7" name="Rectangle 6"/>
+          <p:cNvSpPr/>
+          <p:nvPr/>
+        </p:nvSpPr>
+        <p:spPr>
+          <a:xfrm>
+            <a:off x="4037348" y="2086005"/>
+            <a:ext cx="2467342" cy="1569660"/>
+          </a:xfrm>
+          <a:prstGeom prst="rect">
+            <a:avLst/>
+          </a:prstGeom>
+        </p:spPr>
+        <p:txBody>
+          <a:bodyPr wrap="none">
+            <a:spAutoFit/>
+          </a:bodyPr>
+          <a:lstStyle/>
+          <a:p>
+            <a:pPr algn="ctr"/>
+            <a:r>
+              <a:rPr lang="en-US" sz="9600" b="1" dirty="0" smtClean="0">
+                <a:solidFill>
+                  <a:srgbClr val="9499B7"/>
+                </a:solidFill>
+                <a:latin typeface="Apple Braille" charset="0"/>
+                <a:ea typeface="Apple Braille" charset="0"/>
+                <a:cs typeface="Apple Braille" charset="0"/>
+              </a:rPr>
+              <a:t>hem</a:t>
+            </a:r>
+            <a:endParaRPr lang="en-US" sz="9600" b="1" dirty="0">
+              <a:solidFill>
+                <a:srgbClr val="9499B7"/>
+              </a:solidFill>
+              <a:latin typeface="Apple Braille" charset="0"/>
+              <a:ea typeface="Apple Braille" charset="0"/>
+              <a:cs typeface="Apple Braille" charset="0"/>
+            </a:endParaRPr>
+          </a:p>
+        </p:txBody>
+      </p:sp>
+    </p:spTree>
+    <p:extLst>
+      <p:ext uri="{BB962C8B-B14F-4D97-AF65-F5344CB8AC3E}">
+        <p14:creationId xmlns:p14="http://schemas.microsoft.com/office/powerpoint/2010/main" val="146579758"/>
+      </p:ext>
+    </p:extLst>
+  </p:cSld>
+  <p:clrMapOvr>
+    <a:masterClrMapping/>
+  </p:clrMapOvr>
+</p:sld>
+</file>
+
+<file path=ppt/slides/slide2.xml><?xml version="1.0" encoding="utf-8"?>
+<p:sld xmlns:a="http://schemas.openxmlformats.org/drawingml/2006/main" xmlns:r="http://schemas.openxmlformats.org/officeDocument/2006/relationships" xmlns:p="http://schemas.openxmlformats.org/presentationml/2006/main">
+  <p:cSld>
+    <p:spTree>
+      <p:nvGrpSpPr>
+        <p:cNvPr id="1" name=""/>
+        <p:cNvGrpSpPr/>
+        <p:nvPr/>
+      </p:nvGrpSpPr>
+      <p:grpSpPr>
+        <a:xfrm>
+          <a:off x="0" y="0"/>
+          <a:ext cx="0" cy="0"/>
+          <a:chOff x="0" y="0"/>
+          <a:chExt cx="0" cy="0"/>
+        </a:xfrm>
+      </p:grpSpPr>
       <p:grpSp>
         <p:nvGrpSpPr>
-          <p:cNvPr id="13" name="Group 12"/>
+          <p:cNvPr id="9" name="Group 8"/>
           <p:cNvGrpSpPr/>
           <p:nvPr/>
         </p:nvGrpSpPr>
         <p:grpSpPr>
           <a:xfrm>
-            <a:off x="2457455" y="1585913"/>
-            <a:ext cx="6763504" cy="2543175"/>
-            <a:chOff x="1828805" y="1471613"/>
-            <a:chExt cx="6763504" cy="2543175"/>
+            <a:off x="2901206" y="1585912"/>
+            <a:ext cx="8424411" cy="2543176"/>
+            <a:chOff x="2901206" y="1585912"/>
+            <a:chExt cx="8424411" cy="2543176"/>
           </a:xfrm>
         </p:grpSpPr>
         <p:sp>
@@ -2991,14 +3530,14 @@
           </p:nvSpPr>
           <p:spPr>
             <a:xfrm>
-              <a:off x="1828805" y="1471613"/>
+              <a:off x="2901206" y="1585913"/>
               <a:ext cx="1800225" cy="2543175"/>
             </a:xfrm>
             <a:prstGeom prst="rect">
               <a:avLst/>
             </a:prstGeom>
             <a:solidFill>
-              <a:srgbClr val="C5CAE9"/>
+              <a:srgbClr val="6DAB66"/>
             </a:solidFill>
             <a:ln>
               <a:noFill/>
@@ -3028,23 +3567,17 @@
               <a:r>
                 <a:rPr lang="en-US" sz="9600" b="1" dirty="0" smtClean="0">
                   <a:solidFill>
-                    <a:schemeClr val="tx1">
-                      <a:lumMod val="75000"/>
-                      <a:lumOff val="25000"/>
-                    </a:schemeClr>
+                    <a:srgbClr val="E5F1E4"/>
                   </a:solidFill>
                   <a:latin typeface="Apple Braille" charset="0"/>
                   <a:ea typeface="Apple Braille" charset="0"/>
                   <a:cs typeface="Apple Braille" charset="0"/>
                 </a:rPr>
-                <a:t>H</a:t>
+                <a:t>C</a:t>
               </a:r>
               <a:endParaRPr lang="en-US" sz="9600" b="1" dirty="0">
                 <a:solidFill>
-                  <a:schemeClr val="tx1">
-                    <a:lumMod val="75000"/>
-                    <a:lumOff val="25000"/>
-                  </a:schemeClr>
+                  <a:srgbClr val="E5F1E4"/>
                 </a:solidFill>
                 <a:latin typeface="Apple Braille" charset="0"/>
                 <a:ea typeface="Apple Braille" charset="0"/>
@@ -3061,7 +3594,7 @@
           </p:nvSpPr>
           <p:spPr>
             <a:xfrm>
-              <a:off x="2100265" y="1614482"/>
+              <a:off x="3172666" y="1728782"/>
               <a:ext cx="45719" cy="523220"/>
             </a:xfrm>
             <a:prstGeom prst="rect">
@@ -3087,7 +3620,7 @@
                   <a:ea typeface="Apple Braille" charset="0"/>
                   <a:cs typeface="Apple Braille" charset="0"/>
                 </a:rPr>
-                <a:t>1</a:t>
+                <a:t>6</a:t>
               </a:r>
               <a:endParaRPr lang="en-US" sz="2800" b="1" dirty="0">
                 <a:solidFill>
@@ -3105,64 +3638,20 @@
         </p:sp>
         <p:sp>
           <p:nvSpPr>
-            <p:cNvPr id="7" name="Rectangle 6"/>
-            <p:cNvSpPr/>
-            <p:nvPr/>
-          </p:nvSpPr>
-          <p:spPr>
-            <a:xfrm>
-              <a:off x="3655179" y="1971705"/>
-              <a:ext cx="1452642" cy="1569660"/>
-            </a:xfrm>
-            <a:prstGeom prst="rect">
-              <a:avLst/>
-            </a:prstGeom>
-          </p:spPr>
-          <p:txBody>
-            <a:bodyPr wrap="none">
-              <a:spAutoFit/>
-            </a:bodyPr>
-            <a:lstStyle/>
-            <a:p>
-              <a:pPr algn="ctr"/>
-              <a:r>
-                <a:rPr lang="en-US" sz="9600" b="1" dirty="0" smtClean="0">
-                  <a:solidFill>
-                    <a:srgbClr val="9499B7"/>
-                  </a:solidFill>
-                  <a:latin typeface="Apple Braille" charset="0"/>
-                  <a:ea typeface="Apple Braille" charset="0"/>
-                  <a:cs typeface="Apple Braille" charset="0"/>
-                </a:rPr>
-                <a:t>an</a:t>
-              </a:r>
-              <a:endParaRPr lang="en-US" sz="9600" b="1" dirty="0">
-                <a:solidFill>
-                  <a:srgbClr val="9499B7"/>
-                </a:solidFill>
-                <a:latin typeface="Apple Braille" charset="0"/>
-                <a:ea typeface="Apple Braille" charset="0"/>
-                <a:cs typeface="Apple Braille" charset="0"/>
-              </a:endParaRPr>
-            </a:p>
-          </p:txBody>
-        </p:sp>
-        <p:sp>
-          <p:nvSpPr>
             <p:cNvPr id="10" name="Rectangle 9"/>
             <p:cNvSpPr/>
             <p:nvPr/>
           </p:nvSpPr>
           <p:spPr>
             <a:xfrm>
-              <a:off x="5367343" y="1471613"/>
+              <a:off x="5995993" y="1585913"/>
               <a:ext cx="1800225" cy="2543175"/>
             </a:xfrm>
             <a:prstGeom prst="rect">
               <a:avLst/>
             </a:prstGeom>
             <a:solidFill>
-              <a:srgbClr val="9499B7"/>
+              <a:srgbClr val="468D3E"/>
             </a:solidFill>
             <a:ln>
               <a:noFill/>
@@ -3192,10 +3681,7 @@
               <a:r>
                 <a:rPr lang="en-US" sz="9600" b="1" dirty="0" smtClean="0">
                   <a:solidFill>
-                    <a:schemeClr val="tx1">
-                      <a:lumMod val="75000"/>
-                      <a:lumOff val="25000"/>
-                    </a:schemeClr>
+                    <a:srgbClr val="E5F1E4"/>
                   </a:solidFill>
                   <a:latin typeface="Apple Braille" charset="0"/>
                   <a:ea typeface="Apple Braille" charset="0"/>
@@ -3204,23 +3690,19 @@
                 <a:t>L</a:t>
               </a:r>
               <a:r>
-                <a:rPr lang="en-US" sz="9600" b="1" dirty="0" smtClean="0">
+                <a:rPr lang="en-US" sz="9600" b="1" dirty="0">
                   <a:solidFill>
-                    <a:schemeClr val="bg1">
-                      <a:lumMod val="65000"/>
-                    </a:schemeClr>
+                    <a:srgbClr val="E5F1E4"/>
                   </a:solidFill>
                   <a:latin typeface="Apple Braille" charset="0"/>
                   <a:ea typeface="Apple Braille" charset="0"/>
                   <a:cs typeface="Apple Braille" charset="0"/>
                 </a:rPr>
-                <a:t>i</a:t>
+                <a:t>a</a:t>
               </a:r>
               <a:endParaRPr lang="en-US" sz="9600" b="1" dirty="0">
                 <a:solidFill>
-                  <a:schemeClr val="bg1">
-                    <a:lumMod val="65000"/>
-                  </a:schemeClr>
+                  <a:srgbClr val="9AC995"/>
                 </a:solidFill>
                 <a:latin typeface="Apple Braille" charset="0"/>
                 <a:ea typeface="Apple Braille" charset="0"/>
@@ -3236,9 +3718,167 @@
             <p:nvPr/>
           </p:nvSpPr>
           <p:spPr>
+            <a:xfrm flipH="1">
+              <a:off x="6350909" y="1728782"/>
+              <a:ext cx="600204" cy="523220"/>
+            </a:xfrm>
+            <a:prstGeom prst="rect">
+              <a:avLst/>
+            </a:prstGeom>
+            <a:noFill/>
+          </p:spPr>
+          <p:txBody>
+            <a:bodyPr wrap="square" rtlCol="0">
+              <a:spAutoFit/>
+            </a:bodyPr>
+            <a:lstStyle/>
+            <a:p>
+              <a:r>
+                <a:rPr lang="en-US" sz="2800" b="1" smtClean="0">
+                  <a:solidFill>
+                    <a:schemeClr val="tx1">
+                      <a:lumMod val="75000"/>
+                      <a:lumOff val="25000"/>
+                    </a:schemeClr>
+                  </a:solidFill>
+                  <a:latin typeface="Apple Braille" charset="0"/>
+                  <a:ea typeface="Apple Braille" charset="0"/>
+                  <a:cs typeface="Apple Braille" charset="0"/>
+                </a:rPr>
+                <a:t>57</a:t>
+              </a:r>
+              <a:endParaRPr lang="en-US" sz="2800" b="1" dirty="0">
+                <a:solidFill>
+                  <a:schemeClr val="tx1">
+                    <a:lumMod val="75000"/>
+                    <a:lumOff val="25000"/>
+                  </a:schemeClr>
+                </a:solidFill>
+                <a:latin typeface="Apple Braille" charset="0"/>
+                <a:ea typeface="Apple Braille" charset="0"/>
+                <a:cs typeface="Apple Braille" charset="0"/>
+              </a:endParaRPr>
+            </a:p>
+          </p:txBody>
+        </p:sp>
+        <p:sp>
+          <p:nvSpPr>
+            <p:cNvPr id="12" name="Rectangle 11"/>
+            <p:cNvSpPr/>
+            <p:nvPr/>
+          </p:nvSpPr>
+          <p:spPr>
             <a:xfrm>
-              <a:off x="5638803" y="1614482"/>
-              <a:ext cx="45719" cy="523220"/>
+              <a:off x="7366101" y="2072670"/>
+              <a:ext cx="845103" cy="1569660"/>
+            </a:xfrm>
+            <a:prstGeom prst="rect">
+              <a:avLst/>
+            </a:prstGeom>
+          </p:spPr>
+          <p:txBody>
+            <a:bodyPr wrap="none">
+              <a:spAutoFit/>
+            </a:bodyPr>
+            <a:lstStyle/>
+            <a:p>
+              <a:pPr algn="ctr"/>
+              <a:r>
+                <a:rPr lang="en-US" sz="9600" b="1" dirty="0" smtClean="0">
+                  <a:solidFill>
+                    <a:srgbClr val="9AC995"/>
+                  </a:solidFill>
+                  <a:latin typeface="Apple Braille" charset="0"/>
+                  <a:ea typeface="Apple Braille" charset="0"/>
+                  <a:cs typeface="Apple Braille" charset="0"/>
+                </a:rPr>
+                <a:t>b</a:t>
+              </a:r>
+              <a:endParaRPr lang="en-US" sz="9600" b="1" dirty="0">
+                <a:solidFill>
+                  <a:srgbClr val="9AC995"/>
+                </a:solidFill>
+                <a:latin typeface="Apple Braille" charset="0"/>
+                <a:ea typeface="Apple Braille" charset="0"/>
+                <a:cs typeface="Apple Braille" charset="0"/>
+              </a:endParaRPr>
+            </a:p>
+          </p:txBody>
+        </p:sp>
+        <p:sp>
+          <p:nvSpPr>
+            <p:cNvPr id="14" name="Rectangle 13"/>
+            <p:cNvSpPr/>
+            <p:nvPr/>
+          </p:nvSpPr>
+          <p:spPr>
+            <a:xfrm>
+              <a:off x="8283554" y="1585912"/>
+              <a:ext cx="1800225" cy="2543175"/>
+            </a:xfrm>
+            <a:prstGeom prst="rect">
+              <a:avLst/>
+            </a:prstGeom>
+            <a:solidFill>
+              <a:srgbClr val="6DAB66"/>
+            </a:solidFill>
+            <a:ln>
+              <a:noFill/>
+            </a:ln>
+          </p:spPr>
+          <p:style>
+            <a:lnRef idx="2">
+              <a:schemeClr val="accent1">
+                <a:shade val="50000"/>
+              </a:schemeClr>
+            </a:lnRef>
+            <a:fillRef idx="1">
+              <a:schemeClr val="accent1"/>
+            </a:fillRef>
+            <a:effectRef idx="0">
+              <a:schemeClr val="accent1"/>
+            </a:effectRef>
+            <a:fontRef idx="minor">
+              <a:schemeClr val="lt1"/>
+            </a:fontRef>
+          </p:style>
+          <p:txBody>
+            <a:bodyPr rtlCol="0" anchor="ctr"/>
+            <a:lstStyle/>
+            <a:p>
+              <a:pPr algn="ctr"/>
+              <a:r>
+                <a:rPr lang="en-US" sz="9600" b="1" dirty="0" smtClean="0">
+                  <a:solidFill>
+                    <a:srgbClr val="E5F1E4"/>
+                  </a:solidFill>
+                  <a:latin typeface="Apple Braille" charset="0"/>
+                  <a:ea typeface="Apple Braille" charset="0"/>
+                  <a:cs typeface="Apple Braille" charset="0"/>
+                </a:rPr>
+                <a:t>N</a:t>
+              </a:r>
+              <a:endParaRPr lang="en-US" sz="9600" b="1" dirty="0">
+                <a:solidFill>
+                  <a:srgbClr val="E5F1E4"/>
+                </a:solidFill>
+                <a:latin typeface="Apple Braille" charset="0"/>
+                <a:ea typeface="Apple Braille" charset="0"/>
+                <a:cs typeface="Apple Braille" charset="0"/>
+              </a:endParaRPr>
+            </a:p>
+          </p:txBody>
+        </p:sp>
+        <p:sp>
+          <p:nvSpPr>
+            <p:cNvPr id="16" name="TextBox 15"/>
+            <p:cNvSpPr txBox="1"/>
+            <p:nvPr/>
+          </p:nvSpPr>
+          <p:spPr>
+            <a:xfrm flipH="1">
+              <a:off x="8560462" y="1728782"/>
+              <a:ext cx="637943" cy="523220"/>
             </a:xfrm>
             <a:prstGeom prst="rect">
               <a:avLst/>
@@ -3263,7 +3903,7 @@
                   <a:ea typeface="Apple Braille" charset="0"/>
                   <a:cs typeface="Apple Braille" charset="0"/>
                 </a:rPr>
-                <a:t>3</a:t>
+                <a:t>7</a:t>
               </a:r>
               <a:endParaRPr lang="en-US" sz="2800" b="1" dirty="0">
                 <a:solidFill>
@@ -3281,14 +3921,14 @@
         </p:sp>
         <p:sp>
           <p:nvSpPr>
-            <p:cNvPr id="12" name="Rectangle 11"/>
+            <p:cNvPr id="17" name="Rectangle 16"/>
             <p:cNvSpPr/>
             <p:nvPr/>
           </p:nvSpPr>
           <p:spPr>
             <a:xfrm>
-              <a:off x="7166918" y="1958370"/>
-              <a:ext cx="1425391" cy="1569660"/>
+              <a:off x="9446897" y="2086005"/>
+              <a:ext cx="1878720" cy="1569660"/>
             </a:xfrm>
             <a:prstGeom prst="rect">
               <a:avLst/>
@@ -3304,17 +3944,61 @@
               <a:r>
                 <a:rPr lang="en-US" sz="9600" b="1" dirty="0" err="1" smtClean="0">
                   <a:solidFill>
-                    <a:srgbClr val="9499B7"/>
+                    <a:srgbClr val="9AC995"/>
                   </a:solidFill>
                   <a:latin typeface="Apple Braille" charset="0"/>
                   <a:ea typeface="Apple Braille" charset="0"/>
                   <a:cs typeface="Apple Braille" charset="0"/>
                 </a:rPr>
-                <a:t>ee</a:t>
+                <a:t>ote</a:t>
               </a:r>
               <a:endParaRPr lang="en-US" sz="9600" b="1" dirty="0">
                 <a:solidFill>
-                  <a:srgbClr val="9499B7"/>
+                  <a:srgbClr val="9AC995"/>
+                </a:solidFill>
+                <a:latin typeface="Apple Braille" charset="0"/>
+                <a:ea typeface="Apple Braille" charset="0"/>
+                <a:cs typeface="Apple Braille" charset="0"/>
+              </a:endParaRPr>
+            </a:p>
+          </p:txBody>
+        </p:sp>
+        <p:sp>
+          <p:nvSpPr>
+            <p:cNvPr id="7" name="Rectangle 6"/>
+            <p:cNvSpPr/>
+            <p:nvPr/>
+          </p:nvSpPr>
+          <p:spPr>
+            <a:xfrm>
+              <a:off x="4037348" y="2086005"/>
+              <a:ext cx="2467342" cy="1569660"/>
+            </a:xfrm>
+            <a:prstGeom prst="rect">
+              <a:avLst/>
+            </a:prstGeom>
+          </p:spPr>
+          <p:txBody>
+            <a:bodyPr wrap="none">
+              <a:spAutoFit/>
+            </a:bodyPr>
+            <a:lstStyle/>
+            <a:p>
+              <a:pPr algn="ctr"/>
+              <a:r>
+                <a:rPr lang="en-US" sz="9600" b="1" dirty="0" smtClean="0">
+                  <a:solidFill>
+                    <a:srgbClr val="9AC995"/>
+                  </a:solidFill>
+                  <a:latin typeface="Apple Braille" charset="0"/>
+                  <a:ea typeface="Apple Braille" charset="0"/>
+                  <a:cs typeface="Apple Braille" charset="0"/>
+                </a:rPr>
+                <a:t>hem</a:t>
+              </a:r>
+              <a:endParaRPr lang="en-US" sz="9600" b="1" dirty="0">
+                <a:solidFill>
+                  <a:srgbClr val="9AC995"/>
                 </a:solidFill>
                 <a:latin typeface="Apple Braille" charset="0"/>
                 <a:ea typeface="Apple Braille" charset="0"/>
@@ -3324,10 +4008,200 @@
           </p:txBody>
         </p:sp>
       </p:grpSp>
+      <p:sp>
+        <p:nvSpPr>
+          <p:cNvPr id="3" name="TextBox 2"/>
+          <p:cNvSpPr txBox="1"/>
+          <p:nvPr/>
+        </p:nvSpPr>
+        <p:spPr>
+          <a:xfrm>
+            <a:off x="1550504" y="5744817"/>
+            <a:ext cx="2147832" cy="369332"/>
+          </a:xfrm>
+          <a:prstGeom prst="rect">
+            <a:avLst/>
+          </a:prstGeom>
+          <a:noFill/>
+        </p:spPr>
+        <p:txBody>
+          <a:bodyPr wrap="none" rtlCol="0">
+            <a:spAutoFit/>
+          </a:bodyPr>
+          <a:lstStyle/>
+          <a:p>
+            <a:r>
+              <a:rPr lang="en-US" dirty="0"/>
+              <a:t>background: #f4f7f6;</a:t>
+            </a:r>
+            <a:endParaRPr lang="en-US" dirty="0"/>
+          </a:p>
+        </p:txBody>
+      </p:sp>
+      <p:sp>
+        <p:nvSpPr>
+          <p:cNvPr id="2" name="Rectangle 1"/>
+          <p:cNvSpPr/>
+          <p:nvPr/>
+        </p:nvSpPr>
+        <p:spPr>
+          <a:xfrm>
+            <a:off x="1486127" y="5172525"/>
+            <a:ext cx="2276585" cy="369332"/>
+          </a:xfrm>
+          <a:prstGeom prst="rect">
+            <a:avLst/>
+          </a:prstGeom>
+        </p:spPr>
+        <p:txBody>
+          <a:bodyPr wrap="none">
+            <a:spAutoFit/>
+          </a:bodyPr>
+          <a:lstStyle/>
+          <a:p>
+            <a:r>
+              <a:rPr lang="en-US">
+                <a:solidFill>
+                  <a:srgbClr val="C80000"/>
+                </a:solidFill>
+                <a:latin typeface="Menlo" charset="0"/>
+              </a:rPr>
+              <a:t>color</a:t>
+            </a:r>
+            <a:r>
+              <a:rPr lang="en-US">
+                <a:solidFill>
+                  <a:srgbClr val="303942"/>
+                </a:solidFill>
+                <a:latin typeface="Menlo" charset="0"/>
+              </a:rPr>
+              <a:t>: #202121;</a:t>
+            </a:r>
+            <a:endParaRPr lang="en-US"/>
+          </a:p>
+        </p:txBody>
+      </p:sp>
+      <p:sp>
+        <p:nvSpPr>
+          <p:cNvPr id="4" name="Rectangle 3"/>
+          <p:cNvSpPr/>
+          <p:nvPr/>
+        </p:nvSpPr>
+        <p:spPr>
+          <a:xfrm>
+            <a:off x="1486127" y="4604841"/>
+            <a:ext cx="4786888" cy="369332"/>
+          </a:xfrm>
+          <a:prstGeom prst="rect">
+            <a:avLst/>
+          </a:prstGeom>
+        </p:spPr>
+        <p:txBody>
+          <a:bodyPr wrap="none">
+            <a:spAutoFit/>
+          </a:bodyPr>
+          <a:lstStyle/>
+          <a:p>
+            <a:r>
+              <a:rPr lang="en-US" dirty="0">
+                <a:solidFill>
+                  <a:srgbClr val="C80000"/>
+                </a:solidFill>
+                <a:latin typeface="Menlo" charset="0"/>
+              </a:rPr>
+              <a:t>font-family</a:t>
+            </a:r>
+            <a:r>
+              <a:rPr lang="en-US" dirty="0">
+                <a:solidFill>
+                  <a:srgbClr val="303942"/>
+                </a:solidFill>
+                <a:latin typeface="Menlo" charset="0"/>
+              </a:rPr>
+              <a:t>: "</a:t>
+            </a:r>
+            <a:r>
+              <a:rPr lang="en-US" dirty="0" err="1">
+                <a:solidFill>
+                  <a:srgbClr val="303942"/>
+                </a:solidFill>
+                <a:latin typeface="Menlo" charset="0"/>
+              </a:rPr>
+              <a:t>Roboto</a:t>
+            </a:r>
+            <a:r>
+              <a:rPr lang="en-US" dirty="0">
+                <a:solidFill>
+                  <a:srgbClr val="303942"/>
+                </a:solidFill>
+                <a:latin typeface="Menlo" charset="0"/>
+              </a:rPr>
+              <a:t>",sans-serif;</a:t>
+            </a:r>
+            <a:endParaRPr lang="en-US" dirty="0"/>
+          </a:p>
+        </p:txBody>
+      </p:sp>
+      <p:sp>
+        <p:nvSpPr>
+          <p:cNvPr id="8" name="TextBox 7"/>
+          <p:cNvSpPr txBox="1"/>
+          <p:nvPr/>
+        </p:nvSpPr>
+        <p:spPr>
+          <a:xfrm>
+            <a:off x="4969565" y="5844209"/>
+            <a:ext cx="3719673" cy="646331"/>
+          </a:xfrm>
+          <a:prstGeom prst="rect">
+            <a:avLst/>
+          </a:prstGeom>
+          <a:noFill/>
+        </p:spPr>
+        <p:txBody>
+          <a:bodyPr wrap="none" rtlCol="0">
+            <a:spAutoFit/>
+          </a:bodyPr>
+          <a:lstStyle/>
+          <a:p>
+            <a:r>
+              <a:rPr lang="en-US" dirty="0" smtClean="0"/>
+              <a:t>Button     background-color</a:t>
+            </a:r>
+            <a:r>
+              <a:rPr lang="en-US" dirty="0"/>
+              <a:t>: #49c5b6</a:t>
+            </a:r>
+            <a:r>
+              <a:rPr lang="en-US" dirty="0" smtClean="0"/>
+              <a:t>;</a:t>
+            </a:r>
+          </a:p>
+          <a:p>
+            <a:r>
+              <a:rPr lang="en-US" dirty="0"/>
+              <a:t> </a:t>
+            </a:r>
+            <a:r>
+              <a:rPr lang="en-US" dirty="0" smtClean="0"/>
+              <a:t>                color: #</a:t>
+            </a:r>
+            <a:r>
+              <a:rPr lang="en-US" dirty="0" err="1" smtClean="0"/>
+              <a:t>fff</a:t>
+            </a:r>
+            <a:r>
+              <a:rPr lang="en-US" dirty="0" smtClean="0"/>
+              <a:t>;</a:t>
+            </a:r>
+            <a:endParaRPr lang="en-US" dirty="0"/>
+          </a:p>
+        </p:txBody>
+      </p:sp>
     </p:spTree>
     <p:extLst>
       <p:ext uri="{BB962C8B-B14F-4D97-AF65-F5344CB8AC3E}">
-        <p14:creationId xmlns:p14="http://schemas.microsoft.com/office/powerpoint/2010/main" val="146579758"/>
+        <p14:creationId xmlns:p14="http://schemas.microsoft.com/office/powerpoint/2010/main" val="465104608"/>
       </p:ext>
     </p:extLst>
   </p:cSld>

</xml_diff>